<commit_message>
redo R/ files, suppressing warnings
</commit_message>
<xml_diff>
--- a/lectures/08-Loglin2.pptx
+++ b/lectures/08-Loglin2.pptx
@@ -390,7 +390,7 @@
           <a:p>
             <a:fld id="{08BD4FA9-F3CE-45B3-A980-C331C6F1EF65}" type="datetimeFigureOut">
               <a:rPr lang="en-US" smtClean="0"/>
-              <a:t>12/12/2022</a:t>
+              <a:t>12/15/2022</a:t>
             </a:fld>
             <a:endParaRPr lang="en-US"/>
           </a:p>
@@ -555,7 +555,7 @@
           <a:p>
             <a:fld id="{C16FE993-EADB-4F9C-A20B-913B18CC7060}" type="datetimeFigureOut">
               <a:rPr lang="en-US" smtClean="0"/>
-              <a:t>12/12/2022</a:t>
+              <a:t>12/15/2022</a:t>
             </a:fld>
             <a:endParaRPr lang="en-US"/>
           </a:p>
@@ -1096,7 +1096,7 @@
           <a:p>
             <a:fld id="{EAAD3657-2200-4D14-82C0-10C39B0F0F06}" type="datetime1">
               <a:rPr lang="en-US" smtClean="0"/>
-              <a:t>12/12/2022</a:t>
+              <a:t>12/15/2022</a:t>
             </a:fld>
             <a:endParaRPr lang="en-US"/>
           </a:p>
@@ -1264,7 +1264,7 @@
           <a:p>
             <a:fld id="{11BBAF55-A85E-4993-914E-FC1E5AA7DF24}" type="datetime1">
               <a:rPr lang="en-US" smtClean="0"/>
-              <a:t>12/12/2022</a:t>
+              <a:t>12/15/2022</a:t>
             </a:fld>
             <a:endParaRPr lang="en-US"/>
           </a:p>
@@ -1442,7 +1442,7 @@
           <a:p>
             <a:fld id="{39816E07-E1DB-44A4-A5E5-9F4B54E8C933}" type="datetime1">
               <a:rPr lang="en-US" smtClean="0"/>
-              <a:t>12/12/2022</a:t>
+              <a:t>12/15/2022</a:t>
             </a:fld>
             <a:endParaRPr lang="en-US"/>
           </a:p>
@@ -1627,7 +1627,7 @@
           <a:p>
             <a:fld id="{C2B1AD17-B813-4477-8AFE-B1860CC59113}" type="datetime1">
               <a:rPr lang="en-US" smtClean="0"/>
-              <a:t>12/12/2022</a:t>
+              <a:t>12/15/2022</a:t>
             </a:fld>
             <a:endParaRPr lang="en-US"/>
           </a:p>
@@ -1872,7 +1872,7 @@
           <a:p>
             <a:fld id="{D0975C0D-5C9E-48CC-8D31-F42D19FA8F7A}" type="datetime1">
               <a:rPr lang="en-US" smtClean="0"/>
-              <a:t>12/12/2022</a:t>
+              <a:t>12/15/2022</a:t>
             </a:fld>
             <a:endParaRPr lang="en-US"/>
           </a:p>
@@ -2157,7 +2157,7 @@
           <a:p>
             <a:fld id="{28657551-0F2B-4F09-86FD-F7994CE83DC5}" type="datetime1">
               <a:rPr lang="en-US" smtClean="0"/>
-              <a:t>12/12/2022</a:t>
+              <a:t>12/15/2022</a:t>
             </a:fld>
             <a:endParaRPr lang="en-US"/>
           </a:p>
@@ -2576,7 +2576,7 @@
           <a:p>
             <a:fld id="{3929D2B2-4200-46B9-96C3-02A55D5FAA00}" type="datetime1">
               <a:rPr lang="en-US" smtClean="0"/>
-              <a:t>12/12/2022</a:t>
+              <a:t>12/15/2022</a:t>
             </a:fld>
             <a:endParaRPr lang="en-US"/>
           </a:p>
@@ -2693,7 +2693,7 @@
           <a:p>
             <a:fld id="{41FF7722-74E8-497F-A072-89677A2C2373}" type="datetime1">
               <a:rPr lang="en-US" smtClean="0"/>
-              <a:t>12/12/2022</a:t>
+              <a:t>12/15/2022</a:t>
             </a:fld>
             <a:endParaRPr lang="en-US"/>
           </a:p>
@@ -2788,7 +2788,7 @@
           <a:p>
             <a:fld id="{BD26212E-B46B-426F-AE59-AA326827D9E0}" type="datetime1">
               <a:rPr lang="en-US" smtClean="0"/>
-              <a:t>12/12/2022</a:t>
+              <a:t>12/15/2022</a:t>
             </a:fld>
             <a:endParaRPr lang="en-US"/>
           </a:p>
@@ -3063,7 +3063,7 @@
           <a:p>
             <a:fld id="{FB9B81E8-09EA-4684-A39F-38DE1E49D20C}" type="datetime1">
               <a:rPr lang="en-US" smtClean="0"/>
-              <a:t>12/12/2022</a:t>
+              <a:t>12/15/2022</a:t>
             </a:fld>
             <a:endParaRPr lang="en-US"/>
           </a:p>
@@ -3315,7 +3315,7 @@
           <a:p>
             <a:fld id="{35C5CC5F-056C-4047-9A5C-9F5B4BED129B}" type="datetime1">
               <a:rPr lang="en-US" smtClean="0"/>
-              <a:t>12/12/2022</a:t>
+              <a:t>12/15/2022</a:t>
             </a:fld>
             <a:endParaRPr lang="en-US"/>
           </a:p>
@@ -3529,7 +3529,7 @@
           <a:p>
             <a:fld id="{E8171053-07BD-4A17-AC24-0A22EAA36098}" type="datetime1">
               <a:rPr lang="en-US" smtClean="0"/>
-              <a:t>12/12/2022</a:t>
+              <a:t>12/15/2022</a:t>
             </a:fld>
             <a:endParaRPr lang="en-US"/>
           </a:p>
@@ -6742,7 +6742,7 @@
         <p:spPr>
           <a:xfrm>
             <a:off x="457200" y="533400"/>
-            <a:ext cx="8229600" cy="923330"/>
+            <a:ext cx="8229600" cy="830997"/>
           </a:xfrm>
           <a:prstGeom prst="rect">
             <a:avLst/>
@@ -6762,63 +6762,105 @@
           <a:lstStyle/>
           <a:p>
             <a:r>
-              <a:rPr lang="en-CA" dirty="0" err="1"/>
+              <a:rPr lang="en-CA" sz="1600" dirty="0" err="1">
+                <a:latin typeface="Courier New" panose="02070309020205020404" pitchFamily="49" charset="0"/>
+                <a:cs typeface="Courier New" panose="02070309020205020404" pitchFamily="49" charset="0"/>
+              </a:rPr>
               <a:t>ggplot</a:t>
             </a:r>
             <a:r>
-              <a:rPr lang="en-CA" dirty="0"/>
+              <a:rPr lang="en-CA" sz="1600" dirty="0">
+                <a:latin typeface="Courier New" panose="02070309020205020404" pitchFamily="49" charset="0"/>
+                <a:cs typeface="Courier New" panose="02070309020205020404" pitchFamily="49" charset="0"/>
+              </a:rPr>
               <a:t>(pred2, </a:t>
             </a:r>
             <a:r>
-              <a:rPr lang="en-CA" dirty="0" err="1"/>
+              <a:rPr lang="en-CA" sz="1600" dirty="0" err="1">
+                <a:latin typeface="Courier New" panose="02070309020205020404" pitchFamily="49" charset="0"/>
+                <a:cs typeface="Courier New" panose="02070309020205020404" pitchFamily="49" charset="0"/>
+              </a:rPr>
               <a:t>aes</a:t>
             </a:r>
             <a:r>
-              <a:rPr lang="en-CA" dirty="0"/>
+              <a:rPr lang="en-CA" sz="1600" dirty="0">
+                <a:latin typeface="Courier New" panose="02070309020205020404" pitchFamily="49" charset="0"/>
+                <a:cs typeface="Courier New" panose="02070309020205020404" pitchFamily="49" charset="0"/>
+              </a:rPr>
               <a:t>(x=Dept, y=fit, group=Gender, color=Gender)) +</a:t>
             </a:r>
           </a:p>
           <a:p>
             <a:r>
-              <a:rPr lang="en-CA" dirty="0"/>
+              <a:rPr lang="en-CA" sz="1600" dirty="0">
+                <a:latin typeface="Courier New" panose="02070309020205020404" pitchFamily="49" charset="0"/>
+                <a:cs typeface="Courier New" panose="02070309020205020404" pitchFamily="49" charset="0"/>
+              </a:rPr>
               <a:t>  </a:t>
             </a:r>
             <a:r>
-              <a:rPr lang="en-CA" dirty="0" err="1"/>
+              <a:rPr lang="en-CA" sz="1600" dirty="0" err="1">
+                <a:latin typeface="Courier New" panose="02070309020205020404" pitchFamily="49" charset="0"/>
+                <a:cs typeface="Courier New" panose="02070309020205020404" pitchFamily="49" charset="0"/>
+              </a:rPr>
               <a:t>geom_line</a:t>
             </a:r>
             <a:r>
-              <a:rPr lang="en-CA" dirty="0"/>
+              <a:rPr lang="en-CA" sz="1600" dirty="0">
+                <a:latin typeface="Courier New" panose="02070309020205020404" pitchFamily="49" charset="0"/>
+                <a:cs typeface="Courier New" panose="02070309020205020404" pitchFamily="49" charset="0"/>
+              </a:rPr>
               <a:t>(size=1.4) +</a:t>
             </a:r>
           </a:p>
           <a:p>
             <a:r>
-              <a:rPr lang="en-CA" dirty="0"/>
+              <a:rPr lang="en-CA" sz="1600" dirty="0">
+                <a:latin typeface="Courier New" panose="02070309020205020404" pitchFamily="49" charset="0"/>
+                <a:cs typeface="Courier New" panose="02070309020205020404" pitchFamily="49" charset="0"/>
+              </a:rPr>
               <a:t>  </a:t>
             </a:r>
             <a:r>
-              <a:rPr lang="en-CA" dirty="0" err="1"/>
+              <a:rPr lang="en-CA" sz="1600" dirty="0" err="1">
+                <a:latin typeface="Courier New" panose="02070309020205020404" pitchFamily="49" charset="0"/>
+                <a:cs typeface="Courier New" panose="02070309020205020404" pitchFamily="49" charset="0"/>
+              </a:rPr>
               <a:t>geom_point</a:t>
             </a:r>
             <a:r>
-              <a:rPr lang="en-CA" dirty="0"/>
+              <a:rPr lang="en-CA" sz="1600" dirty="0">
+                <a:latin typeface="Courier New" panose="02070309020205020404" pitchFamily="49" charset="0"/>
+                <a:cs typeface="Courier New" panose="02070309020205020404" pitchFamily="49" charset="0"/>
+              </a:rPr>
               <a:t>(</a:t>
             </a:r>
             <a:r>
-              <a:rPr lang="en-CA" dirty="0" err="1"/>
+              <a:rPr lang="en-CA" sz="1600" dirty="0" err="1">
+                <a:latin typeface="Courier New" panose="02070309020205020404" pitchFamily="49" charset="0"/>
+                <a:cs typeface="Courier New" panose="02070309020205020404" pitchFamily="49" charset="0"/>
+              </a:rPr>
               <a:t>aes</a:t>
             </a:r>
             <a:r>
-              <a:rPr lang="en-CA" dirty="0"/>
+              <a:rPr lang="en-CA" sz="1600" dirty="0">
+                <a:latin typeface="Courier New" panose="02070309020205020404" pitchFamily="49" charset="0"/>
+                <a:cs typeface="Courier New" panose="02070309020205020404" pitchFamily="49" charset="0"/>
+              </a:rPr>
               <a:t>(y=</a:t>
             </a:r>
             <a:r>
-              <a:rPr lang="en-CA" dirty="0" err="1"/>
+              <a:rPr lang="en-CA" sz="1600" dirty="0" err="1">
+                <a:latin typeface="Courier New" panose="02070309020205020404" pitchFamily="49" charset="0"/>
+                <a:cs typeface="Courier New" panose="02070309020205020404" pitchFamily="49" charset="0"/>
+              </a:rPr>
               <a:t>obs</a:t>
             </a:r>
             <a:r>
-              <a:rPr lang="en-CA" dirty="0"/>
+              <a:rPr lang="en-CA" sz="1600" dirty="0">
+                <a:latin typeface="Courier New" panose="02070309020205020404" pitchFamily="49" charset="0"/>
+                <a:cs typeface="Courier New" panose="02070309020205020404" pitchFamily="49" charset="0"/>
+              </a:rPr>
               <a:t>), size=3) + …</a:t>
             </a:r>
           </a:p>
@@ -7651,13 +7693,13 @@
   <p:clrMapOvr>
     <a:masterClrMapping/>
   </p:clrMapOvr>
-  <mc:AlternateContent xmlns:mc="http://schemas.openxmlformats.org/markup-compatibility/2006">
-    <mc:Choice xmlns:p14="http://schemas.microsoft.com/office/powerpoint/2010/main" Requires="p14">
+  <mc:AlternateContent xmlns:mc="http://schemas.openxmlformats.org/markup-compatibility/2006" xmlns:p14="http://schemas.microsoft.com/office/powerpoint/2010/main">
+    <mc:Choice Requires="p14">
       <p:transition spd="slow" p14:dur="2000">
         <p14:prism isContent="1"/>
       </p:transition>
     </mc:Choice>
-    <mc:Fallback>
+    <mc:Fallback xmlns="">
       <p:transition spd="slow">
         <p:fade/>
       </p:transition>
@@ -16261,13 +16303,13 @@
   <p:clrMapOvr>
     <a:masterClrMapping/>
   </p:clrMapOvr>
-  <mc:AlternateContent xmlns:mc="http://schemas.openxmlformats.org/markup-compatibility/2006">
-    <mc:Choice xmlns:p14="http://schemas.microsoft.com/office/powerpoint/2010/main" Requires="p14">
+  <mc:AlternateContent xmlns:mc="http://schemas.openxmlformats.org/markup-compatibility/2006" xmlns:p14="http://schemas.microsoft.com/office/powerpoint/2010/main">
+    <mc:Choice Requires="p14">
       <p:transition spd="slow" p14:dur="2000">
         <p14:prism isContent="1"/>
       </p:transition>
     </mc:Choice>
-    <mc:Fallback>
+    <mc:Fallback xmlns="">
       <p:transition spd="slow">
         <p:fade/>
       </p:transition>
@@ -18553,13 +18595,13 @@
   <p:clrMapOvr>
     <a:masterClrMapping/>
   </p:clrMapOvr>
-  <mc:AlternateContent xmlns:mc="http://schemas.openxmlformats.org/markup-compatibility/2006">
-    <mc:Choice xmlns:p14="http://schemas.microsoft.com/office/powerpoint/2010/main" Requires="p14">
+  <mc:AlternateContent xmlns:mc="http://schemas.openxmlformats.org/markup-compatibility/2006" xmlns:p14="http://schemas.microsoft.com/office/powerpoint/2010/main">
+    <mc:Choice Requires="p14">
       <p:transition spd="slow" p14:dur="2000">
         <p14:prism isContent="1"/>
       </p:transition>
     </mc:Choice>
-    <mc:Fallback>
+    <mc:Fallback xmlns="">
       <p:transition spd="slow">
         <p:fade/>
       </p:transition>
@@ -26243,13 +26285,13 @@
   <p:clrMapOvr>
     <a:masterClrMapping/>
   </p:clrMapOvr>
-  <mc:AlternateContent xmlns:mc="http://schemas.openxmlformats.org/markup-compatibility/2006">
-    <mc:Choice xmlns:p14="http://schemas.microsoft.com/office/powerpoint/2010/main" Requires="p14">
+  <mc:AlternateContent xmlns:mc="http://schemas.openxmlformats.org/markup-compatibility/2006" xmlns:p14="http://schemas.microsoft.com/office/powerpoint/2010/main">
+    <mc:Choice Requires="p14">
       <p:transition spd="slow" p14:dur="2000">
         <p14:prism isContent="1"/>
       </p:transition>
     </mc:Choice>
-    <mc:Fallback>
+    <mc:Fallback xmlns="">
       <p:transition spd="slow">
         <p:fade/>
       </p:transition>

</xml_diff>